<commit_message>
paper updates, a few plot changes and made the azimuth_illustration with a galaxy image
</commit_message>
<xml_diff>
--- a/pilot_paper_code/azimuth_illustration.pptx
+++ b/pilot_paper_code/azimuth_illustration.pptx
@@ -6,6 +6,7 @@
   </p:sldMasterIdLst>
   <p:sldIdLst>
     <p:sldId id="256" r:id="rId2"/>
+    <p:sldId id="257" r:id="rId3"/>
   </p:sldIdLst>
   <p:sldSz cx="9144000" cy="6858000" type="screen4x3"/>
   <p:notesSz cx="6858000" cy="9144000"/>
@@ -288,7 +289,7 @@
           <a:p>
             <a:fld id="{AE28311B-BC99-C549-880F-37C07D38A42A}" type="datetimeFigureOut">
               <a:rPr lang="en-US" smtClean="0"/>
-              <a:t>1/12/16</a:t>
+              <a:t>8/4/16</a:t>
             </a:fld>
             <a:endParaRPr lang="en-US"/>
           </a:p>
@@ -458,7 +459,7 @@
           <a:p>
             <a:fld id="{AE28311B-BC99-C549-880F-37C07D38A42A}" type="datetimeFigureOut">
               <a:rPr lang="en-US" smtClean="0"/>
-              <a:t>1/12/16</a:t>
+              <a:t>8/4/16</a:t>
             </a:fld>
             <a:endParaRPr lang="en-US"/>
           </a:p>
@@ -638,7 +639,7 @@
           <a:p>
             <a:fld id="{AE28311B-BC99-C549-880F-37C07D38A42A}" type="datetimeFigureOut">
               <a:rPr lang="en-US" smtClean="0"/>
-              <a:t>1/12/16</a:t>
+              <a:t>8/4/16</a:t>
             </a:fld>
             <a:endParaRPr lang="en-US"/>
           </a:p>
@@ -808,7 +809,7 @@
           <a:p>
             <a:fld id="{AE28311B-BC99-C549-880F-37C07D38A42A}" type="datetimeFigureOut">
               <a:rPr lang="en-US" smtClean="0"/>
-              <a:t>1/12/16</a:t>
+              <a:t>8/4/16</a:t>
             </a:fld>
             <a:endParaRPr lang="en-US"/>
           </a:p>
@@ -1054,7 +1055,7 @@
           <a:p>
             <a:fld id="{AE28311B-BC99-C549-880F-37C07D38A42A}" type="datetimeFigureOut">
               <a:rPr lang="en-US" smtClean="0"/>
-              <a:t>1/12/16</a:t>
+              <a:t>8/4/16</a:t>
             </a:fld>
             <a:endParaRPr lang="en-US"/>
           </a:p>
@@ -1342,7 +1343,7 @@
           <a:p>
             <a:fld id="{AE28311B-BC99-C549-880F-37C07D38A42A}" type="datetimeFigureOut">
               <a:rPr lang="en-US" smtClean="0"/>
-              <a:t>1/12/16</a:t>
+              <a:t>8/4/16</a:t>
             </a:fld>
             <a:endParaRPr lang="en-US"/>
           </a:p>
@@ -1764,7 +1765,7 @@
           <a:p>
             <a:fld id="{AE28311B-BC99-C549-880F-37C07D38A42A}" type="datetimeFigureOut">
               <a:rPr lang="en-US" smtClean="0"/>
-              <a:t>1/12/16</a:t>
+              <a:t>8/4/16</a:t>
             </a:fld>
             <a:endParaRPr lang="en-US"/>
           </a:p>
@@ -1882,7 +1883,7 @@
           <a:p>
             <a:fld id="{AE28311B-BC99-C549-880F-37C07D38A42A}" type="datetimeFigureOut">
               <a:rPr lang="en-US" smtClean="0"/>
-              <a:t>1/12/16</a:t>
+              <a:t>8/4/16</a:t>
             </a:fld>
             <a:endParaRPr lang="en-US"/>
           </a:p>
@@ -1977,7 +1978,7 @@
           <a:p>
             <a:fld id="{AE28311B-BC99-C549-880F-37C07D38A42A}" type="datetimeFigureOut">
               <a:rPr lang="en-US" smtClean="0"/>
-              <a:t>1/12/16</a:t>
+              <a:t>8/4/16</a:t>
             </a:fld>
             <a:endParaRPr lang="en-US"/>
           </a:p>
@@ -2254,7 +2255,7 @@
           <a:p>
             <a:fld id="{AE28311B-BC99-C549-880F-37C07D38A42A}" type="datetimeFigureOut">
               <a:rPr lang="en-US" smtClean="0"/>
-              <a:t>1/12/16</a:t>
+              <a:t>8/4/16</a:t>
             </a:fld>
             <a:endParaRPr lang="en-US"/>
           </a:p>
@@ -2507,7 +2508,7 @@
           <a:p>
             <a:fld id="{AE28311B-BC99-C549-880F-37C07D38A42A}" type="datetimeFigureOut">
               <a:rPr lang="en-US" smtClean="0"/>
-              <a:t>1/12/16</a:t>
+              <a:t>8/4/16</a:t>
             </a:fld>
             <a:endParaRPr lang="en-US"/>
           </a:p>
@@ -2720,7 +2721,7 @@
           <a:p>
             <a:fld id="{AE28311B-BC99-C549-880F-37C07D38A42A}" type="datetimeFigureOut">
               <a:rPr lang="en-US" smtClean="0"/>
-              <a:t>1/12/16</a:t>
+              <a:t>8/4/16</a:t>
             </a:fld>
             <a:endParaRPr lang="en-US"/>
           </a:p>
@@ -3415,6 +3416,376 @@
     <p:extLst>
       <p:ext uri="{BB962C8B-B14F-4D97-AF65-F5344CB8AC3E}">
         <p14:creationId xmlns:p14="http://schemas.microsoft.com/office/powerpoint/2010/main" val="2515471252"/>
+      </p:ext>
+    </p:extLst>
+  </p:cSld>
+  <p:clrMapOvr>
+    <a:masterClrMapping/>
+  </p:clrMapOvr>
+</p:sld>
+</file>
+
+<file path=ppt/slides/slide2.xml><?xml version="1.0" encoding="utf-8"?>
+<p:sld xmlns:a="http://schemas.openxmlformats.org/drawingml/2006/main" xmlns:r="http://schemas.openxmlformats.org/officeDocument/2006/relationships" xmlns:p="http://schemas.openxmlformats.org/presentationml/2006/main">
+  <p:cSld>
+    <p:spTree>
+      <p:nvGrpSpPr>
+        <p:cNvPr id="1" name=""/>
+        <p:cNvGrpSpPr/>
+        <p:nvPr/>
+      </p:nvGrpSpPr>
+      <p:grpSpPr>
+        <a:xfrm>
+          <a:off x="0" y="0"/>
+          <a:ext cx="0" cy="0"/>
+          <a:chOff x="0" y="0"/>
+          <a:chExt cx="0" cy="0"/>
+        </a:xfrm>
+      </p:grpSpPr>
+      <p:pic>
+        <p:nvPicPr>
+          <p:cNvPr id="2" name="Picture 1" descr="NGC891-Subaru-HST937.jpg"/>
+          <p:cNvPicPr>
+            <a:picLocks noChangeAspect="1"/>
+          </p:cNvPicPr>
+          <p:nvPr/>
+        </p:nvPicPr>
+        <p:blipFill>
+          <a:blip r:embed="rId2">
+            <a:extLst>
+              <a:ext uri="{28A0092B-C50C-407E-A947-70E740481C1C}">
+                <a14:useLocalDpi xmlns:a14="http://schemas.microsoft.com/office/drawing/2010/main" val="0"/>
+              </a:ext>
+            </a:extLst>
+          </a:blip>
+          <a:stretch>
+            <a:fillRect/>
+          </a:stretch>
+        </p:blipFill>
+        <p:spPr>
+          <a:xfrm>
+            <a:off x="3789096" y="634037"/>
+            <a:ext cx="3734181" cy="2391151"/>
+          </a:xfrm>
+          <a:prstGeom prst="rect">
+            <a:avLst/>
+          </a:prstGeom>
+        </p:spPr>
+      </p:pic>
+      <p:cxnSp>
+        <p:nvCxnSpPr>
+          <p:cNvPr id="9" name="Straight Arrow Connector 8"/>
+          <p:cNvCxnSpPr/>
+          <p:nvPr/>
+        </p:nvCxnSpPr>
+        <p:spPr>
+          <a:xfrm flipV="1">
+            <a:off x="3999930" y="1131637"/>
+            <a:ext cx="3342948" cy="1367732"/>
+          </a:xfrm>
+          <a:prstGeom prst="straightConnector1">
+            <a:avLst/>
+          </a:prstGeom>
+          <a:ln w="19050" cmpd="sng">
+            <a:solidFill>
+              <a:srgbClr val="FF0000"/>
+            </a:solidFill>
+            <a:headEnd type="arrow"/>
+            <a:tailEnd type="arrow"/>
+          </a:ln>
+        </p:spPr>
+        <p:style>
+          <a:lnRef idx="2">
+            <a:schemeClr val="dk1"/>
+          </a:lnRef>
+          <a:fillRef idx="0">
+            <a:schemeClr val="dk1"/>
+          </a:fillRef>
+          <a:effectRef idx="1">
+            <a:schemeClr val="dk1"/>
+          </a:effectRef>
+          <a:fontRef idx="minor">
+            <a:schemeClr val="tx1"/>
+          </a:fontRef>
+        </p:style>
+      </p:cxnSp>
+      <p:cxnSp>
+        <p:nvCxnSpPr>
+          <p:cNvPr id="14" name="Straight Arrow Connector 13"/>
+          <p:cNvCxnSpPr/>
+          <p:nvPr/>
+        </p:nvCxnSpPr>
+        <p:spPr>
+          <a:xfrm flipV="1">
+            <a:off x="5103813" y="1783086"/>
+            <a:ext cx="647911" cy="1058539"/>
+          </a:xfrm>
+          <a:prstGeom prst="straightConnector1">
+            <a:avLst/>
+          </a:prstGeom>
+          <a:ln>
+            <a:solidFill>
+              <a:srgbClr val="FFFF00"/>
+            </a:solidFill>
+            <a:tailEnd type="arrow"/>
+          </a:ln>
+        </p:spPr>
+        <p:style>
+          <a:lnRef idx="2">
+            <a:schemeClr val="dk1"/>
+          </a:lnRef>
+          <a:fillRef idx="0">
+            <a:schemeClr val="dk1"/>
+          </a:fillRef>
+          <a:effectRef idx="1">
+            <a:schemeClr val="dk1"/>
+          </a:effectRef>
+          <a:fontRef idx="minor">
+            <a:schemeClr val="tx1"/>
+          </a:fontRef>
+        </p:style>
+      </p:cxnSp>
+      <p:cxnSp>
+        <p:nvCxnSpPr>
+          <p:cNvPr id="16" name="Straight Arrow Connector 15"/>
+          <p:cNvCxnSpPr/>
+          <p:nvPr/>
+        </p:nvCxnSpPr>
+        <p:spPr>
+          <a:xfrm>
+            <a:off x="5620650" y="1499973"/>
+            <a:ext cx="242239" cy="563701"/>
+          </a:xfrm>
+          <a:prstGeom prst="straightConnector1">
+            <a:avLst/>
+          </a:prstGeom>
+          <a:ln w="19050" cmpd="sng">
+            <a:solidFill>
+              <a:srgbClr val="FF0000"/>
+            </a:solidFill>
+            <a:headEnd type="arrow"/>
+            <a:tailEnd type="arrow"/>
+          </a:ln>
+        </p:spPr>
+        <p:style>
+          <a:lnRef idx="2">
+            <a:schemeClr val="dk1"/>
+          </a:lnRef>
+          <a:fillRef idx="0">
+            <a:schemeClr val="dk1"/>
+          </a:fillRef>
+          <a:effectRef idx="1">
+            <a:schemeClr val="dk1"/>
+          </a:effectRef>
+          <a:fontRef idx="minor">
+            <a:schemeClr val="tx1"/>
+          </a:fontRef>
+        </p:style>
+      </p:cxnSp>
+      <p:sp>
+        <p:nvSpPr>
+          <p:cNvPr id="17" name="TextBox 16"/>
+          <p:cNvSpPr txBox="1"/>
+          <p:nvPr/>
+        </p:nvSpPr>
+        <p:spPr>
+          <a:xfrm>
+            <a:off x="6653308" y="994482"/>
+            <a:ext cx="279291" cy="338554"/>
+          </a:xfrm>
+          <a:prstGeom prst="rect">
+            <a:avLst/>
+          </a:prstGeom>
+          <a:noFill/>
+        </p:spPr>
+        <p:txBody>
+          <a:bodyPr wrap="square" rtlCol="0">
+            <a:spAutoFit/>
+          </a:bodyPr>
+          <a:lstStyle/>
+          <a:p>
+            <a:r>
+              <a:rPr lang="en-US" sz="1600" dirty="0" smtClean="0">
+                <a:solidFill>
+                  <a:srgbClr val="FF0000"/>
+                </a:solidFill>
+              </a:rPr>
+              <a:t>a</a:t>
+            </a:r>
+            <a:endParaRPr lang="en-US" sz="1600" dirty="0">
+              <a:solidFill>
+                <a:srgbClr val="FF0000"/>
+              </a:solidFill>
+            </a:endParaRPr>
+          </a:p>
+        </p:txBody>
+      </p:sp>
+      <p:sp>
+        <p:nvSpPr>
+          <p:cNvPr id="18" name="TextBox 17"/>
+          <p:cNvSpPr txBox="1"/>
+          <p:nvPr/>
+        </p:nvSpPr>
+        <p:spPr>
+          <a:xfrm>
+            <a:off x="5642546" y="1444532"/>
+            <a:ext cx="379555" cy="338554"/>
+          </a:xfrm>
+          <a:prstGeom prst="rect">
+            <a:avLst/>
+          </a:prstGeom>
+          <a:noFill/>
+        </p:spPr>
+        <p:txBody>
+          <a:bodyPr wrap="square" rtlCol="0">
+            <a:spAutoFit/>
+          </a:bodyPr>
+          <a:lstStyle/>
+          <a:p>
+            <a:r>
+              <a:rPr lang="en-US" sz="1600" dirty="0" smtClean="0">
+                <a:solidFill>
+                  <a:srgbClr val="FF0000"/>
+                </a:solidFill>
+              </a:rPr>
+              <a:t>b</a:t>
+            </a:r>
+            <a:endParaRPr lang="en-US" sz="1600" dirty="0">
+              <a:solidFill>
+                <a:srgbClr val="FF0000"/>
+              </a:solidFill>
+            </a:endParaRPr>
+          </a:p>
+        </p:txBody>
+      </p:sp>
+      <p:sp>
+        <p:nvSpPr>
+          <p:cNvPr id="26" name="TextBox 25"/>
+          <p:cNvSpPr txBox="1"/>
+          <p:nvPr/>
+        </p:nvSpPr>
+        <p:spPr>
+          <a:xfrm>
+            <a:off x="4999008" y="2080096"/>
+            <a:ext cx="301084" cy="338554"/>
+          </a:xfrm>
+          <a:prstGeom prst="rect">
+            <a:avLst/>
+          </a:prstGeom>
+          <a:noFill/>
+        </p:spPr>
+        <p:txBody>
+          <a:bodyPr wrap="none" rtlCol="0">
+            <a:spAutoFit/>
+          </a:bodyPr>
+          <a:lstStyle/>
+          <a:p>
+            <a:r>
+              <a:rPr lang="en-US" sz="1600" dirty="0" smtClean="0">
+                <a:solidFill>
+                  <a:srgbClr val="FF0000"/>
+                </a:solidFill>
+              </a:rPr>
+              <a:t>α</a:t>
+            </a:r>
+            <a:endParaRPr lang="en-US" sz="1600" dirty="0">
+              <a:solidFill>
+                <a:srgbClr val="FF0000"/>
+              </a:solidFill>
+            </a:endParaRPr>
+          </a:p>
+        </p:txBody>
+      </p:sp>
+      <p:sp>
+        <p:nvSpPr>
+          <p:cNvPr id="30" name="Arc 29"/>
+          <p:cNvSpPr/>
+          <p:nvPr/>
+        </p:nvSpPr>
+        <p:spPr>
+          <a:xfrm rot="11619749">
+            <a:off x="5203971" y="1831167"/>
+            <a:ext cx="514019" cy="494761"/>
+          </a:xfrm>
+          <a:prstGeom prst="arc">
+            <a:avLst/>
+          </a:prstGeom>
+          <a:ln>
+            <a:solidFill>
+              <a:srgbClr val="FFFF00"/>
+            </a:solidFill>
+          </a:ln>
+        </p:spPr>
+        <p:style>
+          <a:lnRef idx="2">
+            <a:schemeClr val="accent2"/>
+          </a:lnRef>
+          <a:fillRef idx="0">
+            <a:schemeClr val="accent2"/>
+          </a:fillRef>
+          <a:effectRef idx="1">
+            <a:schemeClr val="accent2"/>
+          </a:effectRef>
+          <a:fontRef idx="minor">
+            <a:schemeClr val="tx1"/>
+          </a:fontRef>
+        </p:style>
+        <p:txBody>
+          <a:bodyPr rtlCol="0" anchor="ctr"/>
+          <a:lstStyle/>
+          <a:p>
+            <a:pPr algn="ctr"/>
+            <a:endParaRPr lang="en-US"/>
+          </a:p>
+        </p:txBody>
+      </p:sp>
+      <p:sp>
+        <p:nvSpPr>
+          <p:cNvPr id="12" name="5-Point Star 11"/>
+          <p:cNvSpPr/>
+          <p:nvPr/>
+        </p:nvSpPr>
+        <p:spPr>
+          <a:xfrm>
+            <a:off x="4943221" y="2687911"/>
+            <a:ext cx="293008" cy="298959"/>
+          </a:xfrm>
+          <a:prstGeom prst="star5">
+            <a:avLst/>
+          </a:prstGeom>
+          <a:solidFill>
+            <a:srgbClr val="FFFF00"/>
+          </a:solidFill>
+        </p:spPr>
+        <p:style>
+          <a:lnRef idx="2">
+            <a:schemeClr val="accent6">
+              <a:shade val="50000"/>
+            </a:schemeClr>
+          </a:lnRef>
+          <a:fillRef idx="1">
+            <a:schemeClr val="accent6"/>
+          </a:fillRef>
+          <a:effectRef idx="0">
+            <a:schemeClr val="accent6"/>
+          </a:effectRef>
+          <a:fontRef idx="minor">
+            <a:schemeClr val="lt1"/>
+          </a:fontRef>
+        </p:style>
+        <p:txBody>
+          <a:bodyPr rtlCol="0" anchor="ctr"/>
+          <a:lstStyle/>
+          <a:p>
+            <a:pPr algn="ctr"/>
+            <a:endParaRPr lang="en-US"/>
+          </a:p>
+        </p:txBody>
+      </p:sp>
+    </p:spTree>
+    <p:extLst>
+      <p:ext uri="{BB962C8B-B14F-4D97-AF65-F5344CB8AC3E}">
+        <p14:creationId xmlns:p14="http://schemas.microsoft.com/office/powerpoint/2010/main" val="3482581414"/>
       </p:ext>
     </p:extLst>
   </p:cSld>

</xml_diff>